<commit_message>
models folder all updated, controller/auth/index.js and controller/index.js,resentation and excel updated
</commit_message>
<xml_diff>
--- a/assets/presentation/GamersHeim Presentation..pptx
+++ b/assets/presentation/GamersHeim Presentation..pptx
@@ -301,7 +301,7 @@
           <a:p>
             <a:fld id="{8E26E7CA-0DB5-435D-9966-E741A41FC834}" type="datetimeFigureOut">
               <a:rPr lang="en-CA" smtClean="0"/>
-              <a:t>2024-01-16</a:t>
+              <a:t>2024-01-24</a:t>
             </a:fld>
             <a:endParaRPr lang="en-CA"/>
           </a:p>
@@ -471,7 +471,7 @@
           <a:p>
             <a:fld id="{8E26E7CA-0DB5-435D-9966-E741A41FC834}" type="datetimeFigureOut">
               <a:rPr lang="en-CA" smtClean="0"/>
-              <a:t>2024-01-16</a:t>
+              <a:t>2024-01-24</a:t>
             </a:fld>
             <a:endParaRPr lang="en-CA"/>
           </a:p>
@@ -694,7 +694,7 @@
           <a:p>
             <a:fld id="{8E26E7CA-0DB5-435D-9966-E741A41FC834}" type="datetimeFigureOut">
               <a:rPr lang="en-CA" smtClean="0"/>
-              <a:t>2024-01-16</a:t>
+              <a:t>2024-01-24</a:t>
             </a:fld>
             <a:endParaRPr lang="en-CA"/>
           </a:p>
@@ -874,7 +874,7 @@
           <a:p>
             <a:fld id="{8E26E7CA-0DB5-435D-9966-E741A41FC834}" type="datetimeFigureOut">
               <a:rPr lang="en-CA" smtClean="0"/>
-              <a:t>2024-01-16</a:t>
+              <a:t>2024-01-24</a:t>
             </a:fld>
             <a:endParaRPr lang="en-CA"/>
           </a:p>
@@ -1180,7 +1180,7 @@
           <a:p>
             <a:fld id="{8E26E7CA-0DB5-435D-9966-E741A41FC834}" type="datetimeFigureOut">
               <a:rPr lang="en-CA" smtClean="0"/>
-              <a:t>2024-01-16</a:t>
+              <a:t>2024-01-24</a:t>
             </a:fld>
             <a:endParaRPr lang="en-CA"/>
           </a:p>
@@ -1484,7 +1484,7 @@
           <a:p>
             <a:fld id="{8E26E7CA-0DB5-435D-9966-E741A41FC834}" type="datetimeFigureOut">
               <a:rPr lang="en-CA" smtClean="0"/>
-              <a:t>2024-01-16</a:t>
+              <a:t>2024-01-24</a:t>
             </a:fld>
             <a:endParaRPr lang="en-CA"/>
           </a:p>
@@ -1906,7 +1906,7 @@
           <a:p>
             <a:fld id="{8E26E7CA-0DB5-435D-9966-E741A41FC834}" type="datetimeFigureOut">
               <a:rPr lang="en-CA" smtClean="0"/>
-              <a:t>2024-01-16</a:t>
+              <a:t>2024-01-24</a:t>
             </a:fld>
             <a:endParaRPr lang="en-CA"/>
           </a:p>
@@ -2024,7 +2024,7 @@
           <a:p>
             <a:fld id="{8E26E7CA-0DB5-435D-9966-E741A41FC834}" type="datetimeFigureOut">
               <a:rPr lang="en-CA" smtClean="0"/>
-              <a:t>2024-01-16</a:t>
+              <a:t>2024-01-24</a:t>
             </a:fld>
             <a:endParaRPr lang="en-CA"/>
           </a:p>
@@ -2119,7 +2119,7 @@
           <a:p>
             <a:fld id="{8E26E7CA-0DB5-435D-9966-E741A41FC834}" type="datetimeFigureOut">
               <a:rPr lang="en-CA" smtClean="0"/>
-              <a:t>2024-01-16</a:t>
+              <a:t>2024-01-24</a:t>
             </a:fld>
             <a:endParaRPr lang="en-CA"/>
           </a:p>
@@ -2392,7 +2392,7 @@
           <a:p>
             <a:fld id="{8E26E7CA-0DB5-435D-9966-E741A41FC834}" type="datetimeFigureOut">
               <a:rPr lang="en-CA" smtClean="0"/>
-              <a:t>2024-01-16</a:t>
+              <a:t>2024-01-24</a:t>
             </a:fld>
             <a:endParaRPr lang="en-CA"/>
           </a:p>
@@ -2657,7 +2657,7 @@
           <a:p>
             <a:fld id="{8E26E7CA-0DB5-435D-9966-E741A41FC834}" type="datetimeFigureOut">
               <a:rPr lang="en-CA" smtClean="0"/>
-              <a:t>2024-01-16</a:t>
+              <a:t>2024-01-24</a:t>
             </a:fld>
             <a:endParaRPr lang="en-CA"/>
           </a:p>
@@ -2906,7 +2906,7 @@
           <a:p>
             <a:fld id="{8E26E7CA-0DB5-435D-9966-E741A41FC834}" type="datetimeFigureOut">
               <a:rPr lang="en-CA" smtClean="0"/>
-              <a:t>2024-01-16</a:t>
+              <a:t>2024-01-24</a:t>
             </a:fld>
             <a:endParaRPr lang="en-CA"/>
           </a:p>
@@ -3379,18 +3379,92 @@
         </p:nvSpPr>
         <p:spPr/>
         <p:txBody>
-          <a:bodyPr/>
-          <a:lstStyle/>
-          <a:p>
-            <a:r>
-              <a:rPr lang="en-US" dirty="0">
+          <a:bodyPr>
+            <a:normAutofit/>
+          </a:bodyPr>
+          <a:lstStyle/>
+          <a:p>
+            <a:r>
+              <a:rPr lang="en-US" sz="8800" dirty="0">
                 <a:solidFill>
                   <a:srgbClr val="00B0F0"/>
                 </a:solidFill>
               </a:rPr>
-              <a:t>GAMERSHEIM</a:t>
-            </a:r>
-            <a:endParaRPr lang="en-CA" dirty="0">
+              <a:t>G</a:t>
+            </a:r>
+            <a:r>
+              <a:rPr lang="en-US" sz="8800" dirty="0">
+                <a:solidFill>
+                  <a:srgbClr val="FF0000"/>
+                </a:solidFill>
+              </a:rPr>
+              <a:t>A</a:t>
+            </a:r>
+            <a:r>
+              <a:rPr lang="en-US" sz="8800" dirty="0">
+                <a:solidFill>
+                  <a:srgbClr val="00B050"/>
+                </a:solidFill>
+              </a:rPr>
+              <a:t>M</a:t>
+            </a:r>
+            <a:r>
+              <a:rPr lang="en-US" sz="8800" dirty="0">
+                <a:solidFill>
+                  <a:srgbClr val="C00000"/>
+                </a:solidFill>
+              </a:rPr>
+              <a:t>E</a:t>
+            </a:r>
+            <a:r>
+              <a:rPr lang="en-US" sz="8800" dirty="0">
+                <a:solidFill>
+                  <a:srgbClr val="00B0F0"/>
+                </a:solidFill>
+              </a:rPr>
+              <a:t>R</a:t>
+            </a:r>
+            <a:r>
+              <a:rPr lang="en-US" sz="8800" dirty="0">
+                <a:solidFill>
+                  <a:srgbClr val="FFFF00"/>
+                </a:solidFill>
+              </a:rPr>
+              <a:t>S</a:t>
+            </a:r>
+            <a:r>
+              <a:rPr lang="en-US" sz="8800" dirty="0">
+                <a:solidFill>
+                  <a:srgbClr val="7030A0"/>
+                </a:solidFill>
+              </a:rPr>
+              <a:t>H</a:t>
+            </a:r>
+            <a:r>
+              <a:rPr lang="en-US" sz="8800" dirty="0">
+                <a:solidFill>
+                  <a:srgbClr val="00B0F0"/>
+                </a:solidFill>
+              </a:rPr>
+              <a:t>E</a:t>
+            </a:r>
+            <a:r>
+              <a:rPr lang="en-US" sz="8800" dirty="0">
+                <a:solidFill>
+                  <a:srgbClr val="002060"/>
+                </a:solidFill>
+              </a:rPr>
+              <a:t>I</a:t>
+            </a:r>
+            <a:r>
+              <a:rPr lang="en-US" sz="8800" dirty="0">
+                <a:solidFill>
+                  <a:srgbClr val="00B0F0"/>
+                </a:solidFill>
+              </a:rPr>
+              <a:t>M</a:t>
+            </a:r>
+            <a:endParaRPr lang="en-CA" sz="8800" dirty="0">
               <a:solidFill>
                 <a:srgbClr val="00B0F0"/>
               </a:solidFill>
@@ -3398,6 +3472,66 @@
           </a:p>
         </p:txBody>
       </p:sp>
+      <p:pic>
+        <p:nvPicPr>
+          <p:cNvPr id="4" name="Picture 3">
+            <a:extLst>
+              <a:ext uri="{FF2B5EF4-FFF2-40B4-BE49-F238E27FC236}">
+                <a16:creationId xmlns:a16="http://schemas.microsoft.com/office/drawing/2014/main" id="{9820DDA8-9C15-C287-A12A-038F8401C153}"/>
+              </a:ext>
+            </a:extLst>
+          </p:cNvPr>
+          <p:cNvPicPr>
+            <a:picLocks noChangeAspect="1"/>
+          </p:cNvPicPr>
+          <p:nvPr/>
+        </p:nvPicPr>
+        <p:blipFill>
+          <a:blip r:embed="rId2"/>
+          <a:stretch>
+            <a:fillRect/>
+          </a:stretch>
+        </p:blipFill>
+        <p:spPr>
+          <a:xfrm>
+            <a:off x="780619" y="2166364"/>
+            <a:ext cx="1548513" cy="1535768"/>
+          </a:xfrm>
+          <a:prstGeom prst="rect">
+            <a:avLst/>
+          </a:prstGeom>
+        </p:spPr>
+      </p:pic>
+      <p:pic>
+        <p:nvPicPr>
+          <p:cNvPr id="5" name="Picture 4">
+            <a:extLst>
+              <a:ext uri="{FF2B5EF4-FFF2-40B4-BE49-F238E27FC236}">
+                <a16:creationId xmlns:a16="http://schemas.microsoft.com/office/drawing/2014/main" id="{89EEA686-C844-613F-FBF8-7D76BC0CF4EE}"/>
+              </a:ext>
+            </a:extLst>
+          </p:cNvPr>
+          <p:cNvPicPr>
+            <a:picLocks noChangeAspect="1"/>
+          </p:cNvPicPr>
+          <p:nvPr/>
+        </p:nvPicPr>
+        <p:blipFill>
+          <a:blip r:embed="rId2"/>
+          <a:stretch>
+            <a:fillRect/>
+          </a:stretch>
+        </p:blipFill>
+        <p:spPr>
+          <a:xfrm>
+            <a:off x="10033887" y="2166364"/>
+            <a:ext cx="1548513" cy="1535768"/>
+          </a:xfrm>
+          <a:prstGeom prst="rect">
+            <a:avLst/>
+          </a:prstGeom>
+        </p:spPr>
+      </p:pic>
     </p:spTree>
     <p:extLst>
       <p:ext uri="{BB962C8B-B14F-4D97-AF65-F5344CB8AC3E}">
@@ -3521,6 +3655,36 @@
           </a:p>
         </p:txBody>
       </p:sp>
+      <p:pic>
+        <p:nvPicPr>
+          <p:cNvPr id="5" name="Picture 4">
+            <a:extLst>
+              <a:ext uri="{FF2B5EF4-FFF2-40B4-BE49-F238E27FC236}">
+                <a16:creationId xmlns:a16="http://schemas.microsoft.com/office/drawing/2014/main" id="{A835940B-F7B2-E0FA-7400-A84327E9344F}"/>
+              </a:ext>
+            </a:extLst>
+          </p:cNvPr>
+          <p:cNvPicPr>
+            <a:picLocks noChangeAspect="1"/>
+          </p:cNvPicPr>
+          <p:nvPr/>
+        </p:nvPicPr>
+        <p:blipFill>
+          <a:blip r:embed="rId2"/>
+          <a:stretch>
+            <a:fillRect/>
+          </a:stretch>
+        </p:blipFill>
+        <p:spPr>
+          <a:xfrm>
+            <a:off x="10559109" y="413761"/>
+            <a:ext cx="1190554" cy="1249590"/>
+          </a:xfrm>
+          <a:prstGeom prst="rect">
+            <a:avLst/>
+          </a:prstGeom>
+        </p:spPr>
+      </p:pic>
     </p:spTree>
     <p:extLst>
       <p:ext uri="{BB962C8B-B14F-4D97-AF65-F5344CB8AC3E}">
@@ -3740,6 +3904,36 @@
           </a:p>
         </p:txBody>
       </p:sp>
+      <p:pic>
+        <p:nvPicPr>
+          <p:cNvPr id="4" name="Picture 3">
+            <a:extLst>
+              <a:ext uri="{FF2B5EF4-FFF2-40B4-BE49-F238E27FC236}">
+                <a16:creationId xmlns:a16="http://schemas.microsoft.com/office/drawing/2014/main" id="{97BC6CBF-49D3-1F20-B90F-F759F48A5EB1}"/>
+              </a:ext>
+            </a:extLst>
+          </p:cNvPr>
+          <p:cNvPicPr>
+            <a:picLocks noChangeAspect="1"/>
+          </p:cNvPicPr>
+          <p:nvPr/>
+        </p:nvPicPr>
+        <p:blipFill>
+          <a:blip r:embed="rId2"/>
+          <a:stretch>
+            <a:fillRect/>
+          </a:stretch>
+        </p:blipFill>
+        <p:spPr>
+          <a:xfrm>
+            <a:off x="10559109" y="413761"/>
+            <a:ext cx="1190554" cy="1249590"/>
+          </a:xfrm>
+          <a:prstGeom prst="rect">
+            <a:avLst/>
+          </a:prstGeom>
+        </p:spPr>
+      </p:pic>
     </p:spTree>
     <p:extLst>
       <p:ext uri="{BB962C8B-B14F-4D97-AF65-F5344CB8AC3E}">
@@ -4002,6 +4196,36 @@
           </a:p>
         </p:txBody>
       </p:sp>
+      <p:pic>
+        <p:nvPicPr>
+          <p:cNvPr id="4" name="Picture 3">
+            <a:extLst>
+              <a:ext uri="{FF2B5EF4-FFF2-40B4-BE49-F238E27FC236}">
+                <a16:creationId xmlns:a16="http://schemas.microsoft.com/office/drawing/2014/main" id="{4B181F6E-3EB1-5579-AC07-4232C6BA1AEC}"/>
+              </a:ext>
+            </a:extLst>
+          </p:cNvPr>
+          <p:cNvPicPr>
+            <a:picLocks noChangeAspect="1"/>
+          </p:cNvPicPr>
+          <p:nvPr/>
+        </p:nvPicPr>
+        <p:blipFill>
+          <a:blip r:embed="rId2"/>
+          <a:stretch>
+            <a:fillRect/>
+          </a:stretch>
+        </p:blipFill>
+        <p:spPr>
+          <a:xfrm>
+            <a:off x="10559109" y="413761"/>
+            <a:ext cx="1190554" cy="1249590"/>
+          </a:xfrm>
+          <a:prstGeom prst="rect">
+            <a:avLst/>
+          </a:prstGeom>
+        </p:spPr>
+      </p:pic>
     </p:spTree>
     <p:extLst>
       <p:ext uri="{BB962C8B-B14F-4D97-AF65-F5344CB8AC3E}">
@@ -4069,6 +4293,36 @@
           </a:p>
         </p:txBody>
       </p:sp>
+      <p:pic>
+        <p:nvPicPr>
+          <p:cNvPr id="3" name="Picture 2">
+            <a:extLst>
+              <a:ext uri="{FF2B5EF4-FFF2-40B4-BE49-F238E27FC236}">
+                <a16:creationId xmlns:a16="http://schemas.microsoft.com/office/drawing/2014/main" id="{E6204606-8C70-9A59-4F28-580ED6A3F69C}"/>
+              </a:ext>
+            </a:extLst>
+          </p:cNvPr>
+          <p:cNvPicPr>
+            <a:picLocks noChangeAspect="1"/>
+          </p:cNvPicPr>
+          <p:nvPr/>
+        </p:nvPicPr>
+        <p:blipFill>
+          <a:blip r:embed="rId2"/>
+          <a:stretch>
+            <a:fillRect/>
+          </a:stretch>
+        </p:blipFill>
+        <p:spPr>
+          <a:xfrm>
+            <a:off x="10559109" y="413761"/>
+            <a:ext cx="1190554" cy="1249590"/>
+          </a:xfrm>
+          <a:prstGeom prst="rect">
+            <a:avLst/>
+          </a:prstGeom>
+        </p:spPr>
+      </p:pic>
     </p:spTree>
     <p:extLst>
       <p:ext uri="{BB962C8B-B14F-4D97-AF65-F5344CB8AC3E}">
@@ -4169,6 +4423,36 @@
           </a:p>
         </p:txBody>
       </p:sp>
+      <p:pic>
+        <p:nvPicPr>
+          <p:cNvPr id="4" name="Picture 3">
+            <a:extLst>
+              <a:ext uri="{FF2B5EF4-FFF2-40B4-BE49-F238E27FC236}">
+                <a16:creationId xmlns:a16="http://schemas.microsoft.com/office/drawing/2014/main" id="{3B719541-1DB4-2E69-8602-BE4928766E6F}"/>
+              </a:ext>
+            </a:extLst>
+          </p:cNvPr>
+          <p:cNvPicPr>
+            <a:picLocks noChangeAspect="1"/>
+          </p:cNvPicPr>
+          <p:nvPr/>
+        </p:nvPicPr>
+        <p:blipFill>
+          <a:blip r:embed="rId2"/>
+          <a:stretch>
+            <a:fillRect/>
+          </a:stretch>
+        </p:blipFill>
+        <p:spPr>
+          <a:xfrm>
+            <a:off x="10559109" y="413761"/>
+            <a:ext cx="1190554" cy="1249590"/>
+          </a:xfrm>
+          <a:prstGeom prst="rect">
+            <a:avLst/>
+          </a:prstGeom>
+        </p:spPr>
+      </p:pic>
     </p:spTree>
     <p:extLst>
       <p:ext uri="{BB962C8B-B14F-4D97-AF65-F5344CB8AC3E}">
@@ -4343,6 +4627,36 @@
           </a:p>
         </p:txBody>
       </p:sp>
+      <p:pic>
+        <p:nvPicPr>
+          <p:cNvPr id="4" name="Picture 3">
+            <a:extLst>
+              <a:ext uri="{FF2B5EF4-FFF2-40B4-BE49-F238E27FC236}">
+                <a16:creationId xmlns:a16="http://schemas.microsoft.com/office/drawing/2014/main" id="{E9E3CB14-E2FE-250B-B7F3-998EBDE996AE}"/>
+              </a:ext>
+            </a:extLst>
+          </p:cNvPr>
+          <p:cNvPicPr>
+            <a:picLocks noChangeAspect="1"/>
+          </p:cNvPicPr>
+          <p:nvPr/>
+        </p:nvPicPr>
+        <p:blipFill>
+          <a:blip r:embed="rId2"/>
+          <a:stretch>
+            <a:fillRect/>
+          </a:stretch>
+        </p:blipFill>
+        <p:spPr>
+          <a:xfrm>
+            <a:off x="10559109" y="413761"/>
+            <a:ext cx="1190554" cy="1249590"/>
+          </a:xfrm>
+          <a:prstGeom prst="rect">
+            <a:avLst/>
+          </a:prstGeom>
+        </p:spPr>
+      </p:pic>
     </p:spTree>
     <p:extLst>
       <p:ext uri="{BB962C8B-B14F-4D97-AF65-F5344CB8AC3E}">
@@ -4396,17 +4710,57 @@
           </a:bodyPr>
           <a:lstStyle/>
           <a:p>
+            <a:endParaRPr lang="en-US" sz="9600" dirty="0">
+              <a:solidFill>
+                <a:srgbClr val="00B0F0"/>
+              </a:solidFill>
+            </a:endParaRPr>
+          </a:p>
+          <a:p>
+            <a:pPr marL="0" indent="0">
+              <a:buNone/>
+            </a:pPr>
             <a:r>
               <a:rPr lang="en-US" sz="9600" dirty="0">
                 <a:solidFill>
                   <a:srgbClr val="00B0F0"/>
                 </a:solidFill>
               </a:rPr>
-              <a:t>QUESTIONS</a:t>
-            </a:r>
-          </a:p>
-        </p:txBody>
-      </p:sp>
+              <a:t>      QUESTIONS?</a:t>
+            </a:r>
+          </a:p>
+        </p:txBody>
+      </p:sp>
+      <p:pic>
+        <p:nvPicPr>
+          <p:cNvPr id="2" name="Picture 1">
+            <a:extLst>
+              <a:ext uri="{FF2B5EF4-FFF2-40B4-BE49-F238E27FC236}">
+                <a16:creationId xmlns:a16="http://schemas.microsoft.com/office/drawing/2014/main" id="{A31EB617-07B9-BDBD-2AA6-DFC7FA02DFBD}"/>
+              </a:ext>
+            </a:extLst>
+          </p:cNvPr>
+          <p:cNvPicPr>
+            <a:picLocks noChangeAspect="1"/>
+          </p:cNvPicPr>
+          <p:nvPr/>
+        </p:nvPicPr>
+        <p:blipFill>
+          <a:blip r:embed="rId2"/>
+          <a:stretch>
+            <a:fillRect/>
+          </a:stretch>
+        </p:blipFill>
+        <p:spPr>
+          <a:xfrm>
+            <a:off x="10559109" y="413761"/>
+            <a:ext cx="1190554" cy="1249590"/>
+          </a:xfrm>
+          <a:prstGeom prst="rect">
+            <a:avLst/>
+          </a:prstGeom>
+        </p:spPr>
+      </p:pic>
     </p:spTree>
     <p:extLst>
       <p:ext uri="{BB962C8B-B14F-4D97-AF65-F5344CB8AC3E}">
@@ -4486,6 +4840,36 @@
           </a:p>
         </p:txBody>
       </p:sp>
+      <p:pic>
+        <p:nvPicPr>
+          <p:cNvPr id="2" name="Picture 1">
+            <a:extLst>
+              <a:ext uri="{FF2B5EF4-FFF2-40B4-BE49-F238E27FC236}">
+                <a16:creationId xmlns:a16="http://schemas.microsoft.com/office/drawing/2014/main" id="{5E537A26-5AFC-C52B-9C8F-6D323E3000BF}"/>
+              </a:ext>
+            </a:extLst>
+          </p:cNvPr>
+          <p:cNvPicPr>
+            <a:picLocks noChangeAspect="1"/>
+          </p:cNvPicPr>
+          <p:nvPr/>
+        </p:nvPicPr>
+        <p:blipFill>
+          <a:blip r:embed="rId2"/>
+          <a:stretch>
+            <a:fillRect/>
+          </a:stretch>
+        </p:blipFill>
+        <p:spPr>
+          <a:xfrm>
+            <a:off x="10559109" y="413761"/>
+            <a:ext cx="1190554" cy="1249590"/>
+          </a:xfrm>
+          <a:prstGeom prst="rect">
+            <a:avLst/>
+          </a:prstGeom>
+        </p:spPr>
+      </p:pic>
     </p:spTree>
     <p:extLst>
       <p:ext uri="{BB962C8B-B14F-4D97-AF65-F5344CB8AC3E}">

</xml_diff>